<commit_message>
Power point and ipynb update
</commit_message>
<xml_diff>
--- a/Presentation1.pptx
+++ b/Presentation1.pptx
@@ -11,6 +11,13 @@
     <p:sldId id="259" r:id="rId5"/>
     <p:sldId id="260" r:id="rId6"/>
     <p:sldId id="261" r:id="rId7"/>
+    <p:sldId id="262" r:id="rId8"/>
+    <p:sldId id="263" r:id="rId9"/>
+    <p:sldId id="264" r:id="rId10"/>
+    <p:sldId id="268" r:id="rId11"/>
+    <p:sldId id="267" r:id="rId12"/>
+    <p:sldId id="265" r:id="rId13"/>
+    <p:sldId id="266" r:id="rId14"/>
   </p:sldIdLst>
   <p:sldSz cx="12192000" cy="6858000"/>
   <p:notesSz cx="6858000" cy="9144000"/>
@@ -109,6 +116,11 @@
       </a:defRPr>
     </a:lvl9pPr>
   </p:defaultTextStyle>
+  <p:extLst>
+    <p:ext uri="{EFAFB233-063F-42B5-8137-9DF3F51BA10A}">
+      <p15:sldGuideLst xmlns:p15="http://schemas.microsoft.com/office/powerpoint/2012/main"/>
+    </p:ext>
+  </p:extLst>
 </p:presentation>
 </file>
 
@@ -251,7 +263,7 @@
           <a:p>
             <a:fld id="{E24842F6-AAFA-8F45-8A9D-01CDE4916F93}" type="datetimeFigureOut">
               <a:rPr lang="en-KE" smtClean="0"/>
-              <a:t>17/12/2024</a:t>
+              <a:t>22/12/2024</a:t>
             </a:fld>
             <a:endParaRPr lang="en-KE"/>
           </a:p>
@@ -462,7 +474,7 @@
           <a:p>
             <a:fld id="{E24842F6-AAFA-8F45-8A9D-01CDE4916F93}" type="datetimeFigureOut">
               <a:rPr lang="en-KE" smtClean="0"/>
-              <a:t>17/12/2024</a:t>
+              <a:t>22/12/2024</a:t>
             </a:fld>
             <a:endParaRPr lang="en-KE"/>
           </a:p>
@@ -677,7 +689,7 @@
           <a:p>
             <a:fld id="{E24842F6-AAFA-8F45-8A9D-01CDE4916F93}" type="datetimeFigureOut">
               <a:rPr lang="en-KE" smtClean="0"/>
-              <a:t>17/12/2024</a:t>
+              <a:t>22/12/2024</a:t>
             </a:fld>
             <a:endParaRPr lang="en-KE"/>
           </a:p>
@@ -878,7 +890,7 @@
           <a:p>
             <a:fld id="{E24842F6-AAFA-8F45-8A9D-01CDE4916F93}" type="datetimeFigureOut">
               <a:rPr lang="en-KE" smtClean="0"/>
-              <a:t>17/12/2024</a:t>
+              <a:t>22/12/2024</a:t>
             </a:fld>
             <a:endParaRPr lang="en-KE"/>
           </a:p>
@@ -1157,7 +1169,7 @@
           <a:p>
             <a:fld id="{E24842F6-AAFA-8F45-8A9D-01CDE4916F93}" type="datetimeFigureOut">
               <a:rPr lang="en-KE" smtClean="0"/>
-              <a:t>17/12/2024</a:t>
+              <a:t>22/12/2024</a:t>
             </a:fld>
             <a:endParaRPr lang="en-KE"/>
           </a:p>
@@ -1425,7 +1437,7 @@
           <a:p>
             <a:fld id="{E24842F6-AAFA-8F45-8A9D-01CDE4916F93}" type="datetimeFigureOut">
               <a:rPr lang="en-KE" smtClean="0"/>
-              <a:t>17/12/2024</a:t>
+              <a:t>22/12/2024</a:t>
             </a:fld>
             <a:endParaRPr lang="en-KE"/>
           </a:p>
@@ -1841,7 +1853,7 @@
           <a:p>
             <a:fld id="{E24842F6-AAFA-8F45-8A9D-01CDE4916F93}" type="datetimeFigureOut">
               <a:rPr lang="en-KE" smtClean="0"/>
-              <a:t>17/12/2024</a:t>
+              <a:t>22/12/2024</a:t>
             </a:fld>
             <a:endParaRPr lang="en-KE"/>
           </a:p>
@@ -1990,7 +2002,7 @@
           <a:p>
             <a:fld id="{E24842F6-AAFA-8F45-8A9D-01CDE4916F93}" type="datetimeFigureOut">
               <a:rPr lang="en-KE" smtClean="0"/>
-              <a:t>17/12/2024</a:t>
+              <a:t>22/12/2024</a:t>
             </a:fld>
             <a:endParaRPr lang="en-KE"/>
           </a:p>
@@ -2116,7 +2128,7 @@
           <a:p>
             <a:fld id="{E24842F6-AAFA-8F45-8A9D-01CDE4916F93}" type="datetimeFigureOut">
               <a:rPr lang="en-KE" smtClean="0"/>
-              <a:t>17/12/2024</a:t>
+              <a:t>22/12/2024</a:t>
             </a:fld>
             <a:endParaRPr lang="en-KE"/>
           </a:p>
@@ -2367,7 +2379,7 @@
           <a:p>
             <a:fld id="{E24842F6-AAFA-8F45-8A9D-01CDE4916F93}" type="datetimeFigureOut">
               <a:rPr lang="en-KE" smtClean="0"/>
-              <a:t>17/12/2024</a:t>
+              <a:t>22/12/2024</a:t>
             </a:fld>
             <a:endParaRPr lang="en-KE"/>
           </a:p>
@@ -2812,7 +2824,7 @@
           <a:p>
             <a:fld id="{E24842F6-AAFA-8F45-8A9D-01CDE4916F93}" type="datetimeFigureOut">
               <a:rPr lang="en-KE" smtClean="0"/>
-              <a:t>17/12/2024</a:t>
+              <a:t>22/12/2024</a:t>
             </a:fld>
             <a:endParaRPr lang="en-KE"/>
           </a:p>
@@ -3139,7 +3151,7 @@
           <a:p>
             <a:fld id="{E24842F6-AAFA-8F45-8A9D-01CDE4916F93}" type="datetimeFigureOut">
               <a:rPr lang="en-KE" smtClean="0"/>
-              <a:t>17/12/2024</a:t>
+              <a:t>22/12/2024</a:t>
             </a:fld>
             <a:endParaRPr lang="en-KE"/>
           </a:p>
@@ -3694,6 +3706,592 @@
 </p:sld>
 </file>
 
+<file path=ppt/slides/slide10.xml><?xml version="1.0" encoding="utf-8"?>
+<p:sld xmlns:a="http://schemas.openxmlformats.org/drawingml/2006/main" xmlns:r="http://schemas.openxmlformats.org/officeDocument/2006/relationships" xmlns:p="http://schemas.openxmlformats.org/presentationml/2006/main">
+  <p:cSld>
+    <p:spTree>
+      <p:nvGrpSpPr>
+        <p:cNvPr id="1" name="">
+          <a:extLst>
+            <a:ext uri="{FF2B5EF4-FFF2-40B4-BE49-F238E27FC236}">
+              <a16:creationId xmlns:a16="http://schemas.microsoft.com/office/drawing/2014/main" id="{4E0202F9-0037-E803-DD70-0BE3EE892B8D}"/>
+            </a:ext>
+          </a:extLst>
+        </p:cNvPr>
+        <p:cNvGrpSpPr/>
+        <p:nvPr/>
+      </p:nvGrpSpPr>
+      <p:grpSpPr>
+        <a:xfrm>
+          <a:off x="0" y="0"/>
+          <a:ext cx="0" cy="0"/>
+          <a:chOff x="0" y="0"/>
+          <a:chExt cx="0" cy="0"/>
+        </a:xfrm>
+      </p:grpSpPr>
+      <p:sp>
+        <p:nvSpPr>
+          <p:cNvPr id="3" name="Title 2">
+            <a:extLst>
+              <a:ext uri="{FF2B5EF4-FFF2-40B4-BE49-F238E27FC236}">
+                <a16:creationId xmlns:a16="http://schemas.microsoft.com/office/drawing/2014/main" id="{CA5A0574-DD58-FEC7-B807-B352A7E0D91C}"/>
+              </a:ext>
+            </a:extLst>
+          </p:cNvPr>
+          <p:cNvSpPr>
+            <a:spLocks noGrp="1"/>
+          </p:cNvSpPr>
+          <p:nvPr>
+            <p:ph type="title"/>
+          </p:nvPr>
+        </p:nvSpPr>
+        <p:spPr/>
+        <p:txBody>
+          <a:bodyPr/>
+          <a:lstStyle/>
+          <a:p>
+            <a:r>
+              <a:rPr lang="en-GB" dirty="0"/>
+              <a:t>M</a:t>
+            </a:r>
+            <a:r>
+              <a:rPr lang="en-KE" dirty="0"/>
+              <a:t>odel comparison</a:t>
+            </a:r>
+          </a:p>
+        </p:txBody>
+      </p:sp>
+      <p:sp>
+        <p:nvSpPr>
+          <p:cNvPr id="4" name="Content Placeholder 3">
+            <a:extLst>
+              <a:ext uri="{FF2B5EF4-FFF2-40B4-BE49-F238E27FC236}">
+                <a16:creationId xmlns:a16="http://schemas.microsoft.com/office/drawing/2014/main" id="{47146EB1-FC80-D4BE-5421-ADFA696B84CD}"/>
+              </a:ext>
+            </a:extLst>
+          </p:cNvPr>
+          <p:cNvSpPr>
+            <a:spLocks noGrp="1"/>
+          </p:cNvSpPr>
+          <p:nvPr>
+            <p:ph idx="1"/>
+          </p:nvPr>
+        </p:nvSpPr>
+        <p:spPr/>
+        <p:txBody>
+          <a:bodyPr>
+            <a:normAutofit/>
+          </a:bodyPr>
+          <a:lstStyle/>
+          <a:p>
+            <a:pPr marL="0" indent="0" algn="l">
+              <a:spcAft>
+                <a:spcPts val="450"/>
+              </a:spcAft>
+              <a:buNone/>
+            </a:pPr>
+            <a:r>
+              <a:rPr lang="en-GB" dirty="0">
+                <a:latin typeface="Roboto" panose="02000000000000000000" pitchFamily="2" charset="0"/>
+              </a:rPr>
+              <a:t>From all the models mentioned above that were tested, Gradient boosting emerged the best given the size of the data in play for this project.</a:t>
+            </a:r>
+          </a:p>
+          <a:p>
+            <a:r>
+              <a:rPr lang="en-GB" dirty="0">
+                <a:latin typeface="Roboto" panose="02000000000000000000" pitchFamily="2" charset="0"/>
+              </a:rPr>
+              <a:t>The Model combines the </a:t>
+            </a:r>
+            <a:r>
+              <a:rPr lang="en-GB">
+                <a:latin typeface="Roboto" panose="02000000000000000000" pitchFamily="2" charset="0"/>
+              </a:rPr>
+              <a:t>strengths the </a:t>
+            </a:r>
+            <a:r>
+              <a:rPr lang="en-GB" dirty="0">
+                <a:latin typeface="Roboto" panose="02000000000000000000" pitchFamily="2" charset="0"/>
+              </a:rPr>
+              <a:t>flexibility of Decision Trees, allowing it to model complex non-linear relationships, handle interactions between features and generalize well on unseen data. Its performance were further enhanced through Hyperparameter Tuning, which likely led to it outperforming the other models tested.</a:t>
+            </a:r>
+          </a:p>
+          <a:p>
+            <a:endParaRPr lang="en-KE" dirty="0"/>
+          </a:p>
+        </p:txBody>
+      </p:sp>
+    </p:spTree>
+    <p:extLst>
+      <p:ext uri="{BB962C8B-B14F-4D97-AF65-F5344CB8AC3E}">
+        <p14:creationId xmlns:p14="http://schemas.microsoft.com/office/powerpoint/2010/main" val="1023269620"/>
+      </p:ext>
+    </p:extLst>
+  </p:cSld>
+  <p:clrMapOvr>
+    <a:masterClrMapping/>
+  </p:clrMapOvr>
+</p:sld>
+</file>
+
+<file path=ppt/slides/slide11.xml><?xml version="1.0" encoding="utf-8"?>
+<p:sld xmlns:a="http://schemas.openxmlformats.org/drawingml/2006/main" xmlns:r="http://schemas.openxmlformats.org/officeDocument/2006/relationships" xmlns:p="http://schemas.openxmlformats.org/presentationml/2006/main">
+  <p:cSld>
+    <p:spTree>
+      <p:nvGrpSpPr>
+        <p:cNvPr id="1" name="">
+          <a:extLst>
+            <a:ext uri="{FF2B5EF4-FFF2-40B4-BE49-F238E27FC236}">
+              <a16:creationId xmlns:a16="http://schemas.microsoft.com/office/drawing/2014/main" id="{D6DE8301-B6A1-6D81-9144-D1DCF8C28A23}"/>
+            </a:ext>
+          </a:extLst>
+        </p:cNvPr>
+        <p:cNvGrpSpPr/>
+        <p:nvPr/>
+      </p:nvGrpSpPr>
+      <p:grpSpPr>
+        <a:xfrm>
+          <a:off x="0" y="0"/>
+          <a:ext cx="0" cy="0"/>
+          <a:chOff x="0" y="0"/>
+          <a:chExt cx="0" cy="0"/>
+        </a:xfrm>
+      </p:grpSpPr>
+      <p:sp>
+        <p:nvSpPr>
+          <p:cNvPr id="3" name="Title 2">
+            <a:extLst>
+              <a:ext uri="{FF2B5EF4-FFF2-40B4-BE49-F238E27FC236}">
+                <a16:creationId xmlns:a16="http://schemas.microsoft.com/office/drawing/2014/main" id="{E7AB3807-5BF7-A521-C2A5-112483DA91B8}"/>
+              </a:ext>
+            </a:extLst>
+          </p:cNvPr>
+          <p:cNvSpPr>
+            <a:spLocks noGrp="1"/>
+          </p:cNvSpPr>
+          <p:nvPr>
+            <p:ph type="title"/>
+          </p:nvPr>
+        </p:nvSpPr>
+        <p:spPr/>
+        <p:txBody>
+          <a:bodyPr/>
+          <a:lstStyle/>
+          <a:p>
+            <a:r>
+              <a:rPr lang="en-KE" dirty="0"/>
+              <a:t>DATA MODELING</a:t>
+            </a:r>
+          </a:p>
+        </p:txBody>
+      </p:sp>
+      <p:sp>
+        <p:nvSpPr>
+          <p:cNvPr id="4" name="Content Placeholder 3">
+            <a:extLst>
+              <a:ext uri="{FF2B5EF4-FFF2-40B4-BE49-F238E27FC236}">
+                <a16:creationId xmlns:a16="http://schemas.microsoft.com/office/drawing/2014/main" id="{BFFA87CF-C474-11C0-3D2B-8F50E015B6C9}"/>
+              </a:ext>
+            </a:extLst>
+          </p:cNvPr>
+          <p:cNvSpPr>
+            <a:spLocks noGrp="1"/>
+          </p:cNvSpPr>
+          <p:nvPr>
+            <p:ph idx="1"/>
+          </p:nvPr>
+        </p:nvSpPr>
+        <p:spPr/>
+        <p:txBody>
+          <a:bodyPr/>
+          <a:lstStyle/>
+          <a:p>
+            <a:pPr marL="0" indent="0" algn="l">
+              <a:spcAft>
+                <a:spcPts val="450"/>
+              </a:spcAft>
+              <a:buNone/>
+            </a:pPr>
+            <a:r>
+              <a:rPr lang="en-GB" b="0" i="0" dirty="0">
+                <a:effectLst/>
+                <a:latin typeface="Roboto" panose="02000000000000000000" pitchFamily="2" charset="0"/>
+              </a:rPr>
+              <a:t>Several machine learning models will be trained and evaluated, including:</a:t>
+            </a:r>
+          </a:p>
+          <a:p>
+            <a:pPr algn="l">
+              <a:buFont typeface="+mj-lt"/>
+              <a:buAutoNum type="arabicPeriod"/>
+            </a:pPr>
+            <a:r>
+              <a:rPr lang="en-GB" b="0" i="0" dirty="0">
+                <a:effectLst/>
+                <a:latin typeface="Roboto" panose="02000000000000000000" pitchFamily="2" charset="0"/>
+              </a:rPr>
+              <a:t>Logistic Regression</a:t>
+            </a:r>
+          </a:p>
+          <a:p>
+            <a:pPr algn="l">
+              <a:buFont typeface="+mj-lt"/>
+              <a:buAutoNum type="arabicPeriod"/>
+            </a:pPr>
+            <a:r>
+              <a:rPr lang="en-GB" b="0" i="0" dirty="0">
+                <a:effectLst/>
+                <a:latin typeface="Roboto" panose="02000000000000000000" pitchFamily="2" charset="0"/>
+              </a:rPr>
+              <a:t>Regularized Logistic Regression</a:t>
+            </a:r>
+          </a:p>
+          <a:p>
+            <a:pPr algn="l">
+              <a:buFont typeface="+mj-lt"/>
+              <a:buAutoNum type="arabicPeriod"/>
+            </a:pPr>
+            <a:r>
+              <a:rPr lang="en-GB" b="0" i="0" dirty="0">
+                <a:effectLst/>
+                <a:latin typeface="Roboto" panose="02000000000000000000" pitchFamily="2" charset="0"/>
+              </a:rPr>
+              <a:t>Decision Trees</a:t>
+            </a:r>
+          </a:p>
+          <a:p>
+            <a:pPr algn="l">
+              <a:buFont typeface="+mj-lt"/>
+              <a:buAutoNum type="arabicPeriod"/>
+            </a:pPr>
+            <a:r>
+              <a:rPr lang="en-GB" b="0" i="0" dirty="0">
+                <a:effectLst/>
+                <a:latin typeface="Roboto" panose="02000000000000000000" pitchFamily="2" charset="0"/>
+              </a:rPr>
+              <a:t>Random Forest</a:t>
+            </a:r>
+          </a:p>
+          <a:p>
+            <a:pPr algn="l">
+              <a:buFont typeface="+mj-lt"/>
+              <a:buAutoNum type="arabicPeriod"/>
+            </a:pPr>
+            <a:r>
+              <a:rPr lang="en-GB" b="0" i="0" dirty="0">
+                <a:effectLst/>
+                <a:latin typeface="Roboto" panose="02000000000000000000" pitchFamily="2" charset="0"/>
+              </a:rPr>
+              <a:t>Gradient Boosting</a:t>
+            </a:r>
+          </a:p>
+          <a:p>
+            <a:endParaRPr lang="en-KE" dirty="0"/>
+          </a:p>
+        </p:txBody>
+      </p:sp>
+    </p:spTree>
+    <p:extLst>
+      <p:ext uri="{BB962C8B-B14F-4D97-AF65-F5344CB8AC3E}">
+        <p14:creationId xmlns:p14="http://schemas.microsoft.com/office/powerpoint/2010/main" val="1815661309"/>
+      </p:ext>
+    </p:extLst>
+  </p:cSld>
+  <p:clrMapOvr>
+    <a:masterClrMapping/>
+  </p:clrMapOvr>
+</p:sld>
+</file>
+
+<file path=ppt/slides/slide12.xml><?xml version="1.0" encoding="utf-8"?>
+<p:sld xmlns:a="http://schemas.openxmlformats.org/drawingml/2006/main" xmlns:r="http://schemas.openxmlformats.org/officeDocument/2006/relationships" xmlns:p="http://schemas.openxmlformats.org/presentationml/2006/main">
+  <p:cSld>
+    <p:spTree>
+      <p:nvGrpSpPr>
+        <p:cNvPr id="1" name=""/>
+        <p:cNvGrpSpPr/>
+        <p:nvPr/>
+      </p:nvGrpSpPr>
+      <p:grpSpPr>
+        <a:xfrm>
+          <a:off x="0" y="0"/>
+          <a:ext cx="0" cy="0"/>
+          <a:chOff x="0" y="0"/>
+          <a:chExt cx="0" cy="0"/>
+        </a:xfrm>
+      </p:grpSpPr>
+      <p:sp>
+        <p:nvSpPr>
+          <p:cNvPr id="2" name="Title 1">
+            <a:extLst>
+              <a:ext uri="{FF2B5EF4-FFF2-40B4-BE49-F238E27FC236}">
+                <a16:creationId xmlns:a16="http://schemas.microsoft.com/office/drawing/2014/main" id="{54951E08-05A5-0E3C-D7F6-C7355B4DB8BB}"/>
+              </a:ext>
+            </a:extLst>
+          </p:cNvPr>
+          <p:cNvSpPr>
+            <a:spLocks noGrp="1"/>
+          </p:cNvSpPr>
+          <p:nvPr>
+            <p:ph type="title"/>
+          </p:nvPr>
+        </p:nvSpPr>
+        <p:spPr/>
+        <p:txBody>
+          <a:bodyPr/>
+          <a:lstStyle/>
+          <a:p>
+            <a:r>
+              <a:rPr lang="en-GB" b="0" i="0" dirty="0">
+                <a:effectLst/>
+                <a:latin typeface="Roboto" panose="02000000000000000000" pitchFamily="2" charset="0"/>
+              </a:rPr>
+              <a:t>Best model</a:t>
+            </a:r>
+            <a:endParaRPr lang="en-KE" dirty="0"/>
+          </a:p>
+        </p:txBody>
+      </p:sp>
+      <p:sp>
+        <p:nvSpPr>
+          <p:cNvPr id="3" name="Content Placeholder 2">
+            <a:extLst>
+              <a:ext uri="{FF2B5EF4-FFF2-40B4-BE49-F238E27FC236}">
+                <a16:creationId xmlns:a16="http://schemas.microsoft.com/office/drawing/2014/main" id="{43621232-DC15-60C9-E1A9-6B2886B4E481}"/>
+              </a:ext>
+            </a:extLst>
+          </p:cNvPr>
+          <p:cNvSpPr>
+            <a:spLocks noGrp="1"/>
+          </p:cNvSpPr>
+          <p:nvPr>
+            <p:ph idx="1"/>
+          </p:nvPr>
+        </p:nvSpPr>
+        <p:spPr/>
+        <p:txBody>
+          <a:bodyPr>
+            <a:normAutofit lnSpcReduction="10000"/>
+          </a:bodyPr>
+          <a:lstStyle/>
+          <a:p>
+            <a:pPr algn="l">
+              <a:spcBef>
+                <a:spcPts val="525"/>
+              </a:spcBef>
+              <a:spcAft>
+                <a:spcPts val="375"/>
+              </a:spcAft>
+            </a:pPr>
+            <a:r>
+              <a:rPr lang="en-GB" b="0" i="0" dirty="0">
+                <a:effectLst/>
+                <a:latin typeface="Roboto" panose="02000000000000000000" pitchFamily="2" charset="0"/>
+              </a:rPr>
+              <a:t>Best model in our case as indicated on the chart is Gradient Boosting</a:t>
+            </a:r>
+          </a:p>
+          <a:p>
+            <a:pPr algn="l">
+              <a:spcBef>
+                <a:spcPts val="525"/>
+              </a:spcBef>
+              <a:spcAft>
+                <a:spcPts val="450"/>
+              </a:spcAft>
+            </a:pPr>
+            <a:r>
+              <a:rPr lang="en-GB" b="0" i="0" dirty="0">
+                <a:effectLst/>
+                <a:latin typeface="Roboto" panose="02000000000000000000" pitchFamily="2" charset="0"/>
+              </a:rPr>
+              <a:t>Gradient Boosting emerged as the top-performing model for this problem primarily due to the large size of the dataset. It leverages the strengths of ensemble learning and the flexibility of Decision Trees, enabling it to capture complex non-linear relationships, handle feature interactions effectively, and generalize well to unseen data. Additionally, its performance was further optimized through hyperparameter tuning, which likely contributed to its superior results compared to the other models.</a:t>
+            </a:r>
+            <a:br>
+              <a:rPr lang="en-GB" dirty="0"/>
+            </a:br>
+            <a:endParaRPr lang="en-KE" dirty="0"/>
+          </a:p>
+        </p:txBody>
+      </p:sp>
+    </p:spTree>
+    <p:extLst>
+      <p:ext uri="{BB962C8B-B14F-4D97-AF65-F5344CB8AC3E}">
+        <p14:creationId xmlns:p14="http://schemas.microsoft.com/office/powerpoint/2010/main" val="2337275269"/>
+      </p:ext>
+    </p:extLst>
+  </p:cSld>
+  <p:clrMapOvr>
+    <a:masterClrMapping/>
+  </p:clrMapOvr>
+</p:sld>
+</file>
+
+<file path=ppt/slides/slide13.xml><?xml version="1.0" encoding="utf-8"?>
+<p:sld xmlns:a="http://schemas.openxmlformats.org/drawingml/2006/main" xmlns:r="http://schemas.openxmlformats.org/officeDocument/2006/relationships" xmlns:p="http://schemas.openxmlformats.org/presentationml/2006/main">
+  <p:cSld>
+    <p:spTree>
+      <p:nvGrpSpPr>
+        <p:cNvPr id="1" name="">
+          <a:extLst>
+            <a:ext uri="{FF2B5EF4-FFF2-40B4-BE49-F238E27FC236}">
+              <a16:creationId xmlns:a16="http://schemas.microsoft.com/office/drawing/2014/main" id="{5DB339B1-728E-2BE7-E2F1-56760FB006C6}"/>
+            </a:ext>
+          </a:extLst>
+        </p:cNvPr>
+        <p:cNvGrpSpPr/>
+        <p:nvPr/>
+      </p:nvGrpSpPr>
+      <p:grpSpPr>
+        <a:xfrm>
+          <a:off x="0" y="0"/>
+          <a:ext cx="0" cy="0"/>
+          <a:chOff x="0" y="0"/>
+          <a:chExt cx="0" cy="0"/>
+        </a:xfrm>
+      </p:grpSpPr>
+      <p:sp>
+        <p:nvSpPr>
+          <p:cNvPr id="2" name="Title 1">
+            <a:extLst>
+              <a:ext uri="{FF2B5EF4-FFF2-40B4-BE49-F238E27FC236}">
+                <a16:creationId xmlns:a16="http://schemas.microsoft.com/office/drawing/2014/main" id="{7867E61A-CC91-D040-3372-44578B0A1063}"/>
+              </a:ext>
+            </a:extLst>
+          </p:cNvPr>
+          <p:cNvSpPr>
+            <a:spLocks noGrp="1"/>
+          </p:cNvSpPr>
+          <p:nvPr>
+            <p:ph type="title"/>
+          </p:nvPr>
+        </p:nvSpPr>
+        <p:spPr/>
+        <p:txBody>
+          <a:bodyPr/>
+          <a:lstStyle/>
+          <a:p>
+            <a:r>
+              <a:rPr lang="en-GB" b="0" i="0" dirty="0">
+                <a:effectLst/>
+                <a:latin typeface="Roboto" panose="02000000000000000000" pitchFamily="2" charset="0"/>
+              </a:rPr>
+              <a:t>Recommendations</a:t>
+            </a:r>
+            <a:endParaRPr lang="en-KE" dirty="0"/>
+          </a:p>
+        </p:txBody>
+      </p:sp>
+      <p:sp>
+        <p:nvSpPr>
+          <p:cNvPr id="3" name="Content Placeholder 2">
+            <a:extLst>
+              <a:ext uri="{FF2B5EF4-FFF2-40B4-BE49-F238E27FC236}">
+                <a16:creationId xmlns:a16="http://schemas.microsoft.com/office/drawing/2014/main" id="{66BE56A5-F770-47E8-2A0B-D82F70D5EB1E}"/>
+              </a:ext>
+            </a:extLst>
+          </p:cNvPr>
+          <p:cNvSpPr>
+            <a:spLocks noGrp="1"/>
+          </p:cNvSpPr>
+          <p:nvPr>
+            <p:ph idx="1"/>
+          </p:nvPr>
+        </p:nvSpPr>
+        <p:spPr/>
+        <p:txBody>
+          <a:bodyPr>
+            <a:normAutofit fontScale="85000" lnSpcReduction="10000"/>
+          </a:bodyPr>
+          <a:lstStyle/>
+          <a:p>
+            <a:pPr>
+              <a:spcBef>
+                <a:spcPts val="525"/>
+              </a:spcBef>
+              <a:spcAft>
+                <a:spcPts val="450"/>
+              </a:spcAft>
+            </a:pPr>
+            <a:r>
+              <a:rPr lang="en-GB" b="0" i="0" dirty="0">
+                <a:effectLst/>
+                <a:latin typeface="Roboto" panose="02000000000000000000" pitchFamily="2" charset="0"/>
+              </a:rPr>
+              <a:t>Policy Adjustments: Modify traffic regulations and safety measures based on observed patterns, such as enhancing signage or enforcing speed limits in high-risk zones.</a:t>
+            </a:r>
+          </a:p>
+          <a:p>
+            <a:pPr algn="l">
+              <a:spcBef>
+                <a:spcPts val="525"/>
+              </a:spcBef>
+              <a:spcAft>
+                <a:spcPts val="450"/>
+              </a:spcAft>
+            </a:pPr>
+            <a:r>
+              <a:rPr lang="en-GB" b="0" i="0" dirty="0">
+                <a:effectLst/>
+                <a:latin typeface="Roboto" panose="02000000000000000000" pitchFamily="2" charset="0"/>
+              </a:rPr>
+              <a:t>Enhanced Traffic Monitoring: Focus on targeted interventions in areas with high accident rates, addressing the identified contributory factors to mitigate risks effectively.</a:t>
+            </a:r>
+          </a:p>
+          <a:p>
+            <a:pPr algn="l">
+              <a:spcBef>
+                <a:spcPts val="525"/>
+              </a:spcBef>
+              <a:spcAft>
+                <a:spcPts val="450"/>
+              </a:spcAft>
+            </a:pPr>
+            <a:r>
+              <a:rPr lang="en-GB" b="0" i="0" dirty="0">
+                <a:effectLst/>
+                <a:latin typeface="Roboto" panose="02000000000000000000" pitchFamily="2" charset="0"/>
+              </a:rPr>
+              <a:t>Model Deployment: Deploy the top-performing model in a real-time traffic monitoring system to deliver proactive alerts and help reduce accident rates.</a:t>
+            </a:r>
+          </a:p>
+          <a:p>
+            <a:pPr algn="l">
+              <a:spcBef>
+                <a:spcPts val="525"/>
+              </a:spcBef>
+              <a:spcAft>
+                <a:spcPts val="450"/>
+              </a:spcAft>
+            </a:pPr>
+            <a:r>
+              <a:rPr lang="en-GB" b="0" i="0" dirty="0">
+                <a:effectLst/>
+                <a:latin typeface="Roboto" panose="02000000000000000000" pitchFamily="2" charset="0"/>
+              </a:rPr>
+              <a:t>Further Research: Expand this analysis by incorporating more recent data and additional features, such as vehicle types and driver demographics, to improve model accuracy and insights.</a:t>
+            </a:r>
+            <a:br>
+              <a:rPr lang="en-GB" dirty="0"/>
+            </a:br>
+            <a:endParaRPr lang="en-KE" dirty="0"/>
+          </a:p>
+        </p:txBody>
+      </p:sp>
+    </p:spTree>
+    <p:extLst>
+      <p:ext uri="{BB962C8B-B14F-4D97-AF65-F5344CB8AC3E}">
+        <p14:creationId xmlns:p14="http://schemas.microsoft.com/office/powerpoint/2010/main" val="1919562608"/>
+      </p:ext>
+    </p:extLst>
+  </p:cSld>
+  <p:clrMapOvr>
+    <a:masterClrMapping/>
+  </p:clrMapOvr>
+</p:sld>
+</file>
+
 <file path=ppt/slides/slide2.xml><?xml version="1.0" encoding="utf-8"?>
 <p:sld xmlns:a="http://schemas.openxmlformats.org/drawingml/2006/main" xmlns:r="http://schemas.openxmlformats.org/officeDocument/2006/relationships" xmlns:p="http://schemas.openxmlformats.org/presentationml/2006/main">
   <p:cSld>
@@ -5777,6 +6375,1456 @@
     <p:extLst>
       <p:ext uri="{BB962C8B-B14F-4D97-AF65-F5344CB8AC3E}">
         <p14:creationId xmlns:p14="http://schemas.microsoft.com/office/powerpoint/2010/main" val="2495934607"/>
+      </p:ext>
+    </p:extLst>
+  </p:cSld>
+  <p:clrMapOvr>
+    <a:masterClrMapping/>
+  </p:clrMapOvr>
+</p:sld>
+</file>
+
+<file path=ppt/slides/slide7.xml><?xml version="1.0" encoding="utf-8"?>
+<p:sld xmlns:a="http://schemas.openxmlformats.org/drawingml/2006/main" xmlns:r="http://schemas.openxmlformats.org/officeDocument/2006/relationships" xmlns:p="http://schemas.openxmlformats.org/presentationml/2006/main">
+  <p:cSld>
+    <p:bg>
+      <p:bgPr>
+        <a:gradFill rotWithShape="1">
+          <a:gsLst>
+            <a:gs pos="0">
+              <a:schemeClr val="bg2">
+                <a:tint val="94000"/>
+                <a:satMod val="80000"/>
+                <a:lumMod val="106000"/>
+              </a:schemeClr>
+            </a:gs>
+            <a:gs pos="100000">
+              <a:schemeClr val="bg2">
+                <a:shade val="80000"/>
+              </a:schemeClr>
+            </a:gs>
+          </a:gsLst>
+          <a:path path="circle">
+            <a:fillToRect l="43000" r="43000" b="100000"/>
+          </a:path>
+        </a:gradFill>
+        <a:effectLst/>
+      </p:bgPr>
+    </p:bg>
+    <p:spTree>
+      <p:nvGrpSpPr>
+        <p:cNvPr id="1" name="">
+          <a:extLst>
+            <a:ext uri="{FF2B5EF4-FFF2-40B4-BE49-F238E27FC236}">
+              <a16:creationId xmlns:a16="http://schemas.microsoft.com/office/drawing/2014/main" id="{089090D0-D9AA-EEE1-2F7B-0BF0CA77F37D}"/>
+            </a:ext>
+          </a:extLst>
+        </p:cNvPr>
+        <p:cNvGrpSpPr/>
+        <p:nvPr/>
+      </p:nvGrpSpPr>
+      <p:grpSpPr>
+        <a:xfrm>
+          <a:off x="0" y="0"/>
+          <a:ext cx="0" cy="0"/>
+          <a:chOff x="0" y="0"/>
+          <a:chExt cx="0" cy="0"/>
+        </a:xfrm>
+      </p:grpSpPr>
+      <p:sp>
+        <p:nvSpPr>
+          <p:cNvPr id="37" name="Rectangle 36">
+            <a:extLst>
+              <a:ext uri="{FF2B5EF4-FFF2-40B4-BE49-F238E27FC236}">
+                <a16:creationId xmlns:a16="http://schemas.microsoft.com/office/drawing/2014/main" id="{D4BCBF9C-C8D4-FBE0-7AAA-4E2FA306B2DD}"/>
+              </a:ext>
+              <a:ext uri="{C183D7F6-B498-43B3-948B-1728B52AA6E4}">
+                <adec:decorative xmlns:adec="http://schemas.microsoft.com/office/drawing/2017/decorative" val="1"/>
+              </a:ext>
+            </a:extLst>
+          </p:cNvPr>
+          <p:cNvSpPr>
+            <a:spLocks noGrp="1" noRot="1" noChangeAspect="1" noMove="1" noResize="1" noEditPoints="1" noAdjustHandles="1" noChangeArrowheads="1" noChangeShapeType="1" noTextEdit="1"/>
+          </p:cNvSpPr>
+          <p:nvPr>
+            <p:extLst>
+              <p:ext uri="{386F3935-93C4-4BCD-93E2-E3B085C9AB24}">
+                <p16:designElem xmlns:p16="http://schemas.microsoft.com/office/powerpoint/2015/main" val="1"/>
+              </p:ext>
+            </p:extLst>
+          </p:nvPr>
+        </p:nvSpPr>
+        <p:spPr>
+          <a:xfrm>
+            <a:off x="0" y="2019476"/>
+            <a:ext cx="12192000" cy="4105941"/>
+          </a:xfrm>
+          <a:prstGeom prst="rect">
+            <a:avLst/>
+          </a:prstGeom>
+          <a:gradFill flip="none" rotWithShape="1">
+            <a:gsLst>
+              <a:gs pos="0">
+                <a:schemeClr val="bg2">
+                  <a:alpha val="0"/>
+                </a:schemeClr>
+              </a:gs>
+              <a:gs pos="100000">
+                <a:schemeClr val="bg2"/>
+              </a:gs>
+            </a:gsLst>
+            <a:lin ang="5400000" scaled="0"/>
+            <a:tileRect/>
+          </a:gradFill>
+          <a:ln>
+            <a:noFill/>
+          </a:ln>
+        </p:spPr>
+        <p:style>
+          <a:lnRef idx="2">
+            <a:schemeClr val="accent1">
+              <a:shade val="50000"/>
+            </a:schemeClr>
+          </a:lnRef>
+          <a:fillRef idx="1">
+            <a:schemeClr val="accent1"/>
+          </a:fillRef>
+          <a:effectRef idx="0">
+            <a:schemeClr val="accent1"/>
+          </a:effectRef>
+          <a:fontRef idx="minor">
+            <a:schemeClr val="lt1"/>
+          </a:fontRef>
+        </p:style>
+        <p:txBody>
+          <a:bodyPr/>
+          <a:lstStyle/>
+          <a:p>
+            <a:endParaRPr lang="en-KE"/>
+          </a:p>
+        </p:txBody>
+      </p:sp>
+      <p:pic>
+        <p:nvPicPr>
+          <p:cNvPr id="39" name="Picture 38">
+            <a:extLst>
+              <a:ext uri="{FF2B5EF4-FFF2-40B4-BE49-F238E27FC236}">
+                <a16:creationId xmlns:a16="http://schemas.microsoft.com/office/drawing/2014/main" id="{222F873F-EE3A-769A-7093-29528A4A810F}"/>
+              </a:ext>
+              <a:ext uri="{C183D7F6-B498-43B3-948B-1728B52AA6E4}">
+                <adec:decorative xmlns:adec="http://schemas.microsoft.com/office/drawing/2017/decorative" val="1"/>
+              </a:ext>
+            </a:extLst>
+          </p:cNvPr>
+          <p:cNvPicPr>
+            <a:picLocks noGrp="1" noRot="1" noChangeAspect="1" noMove="1" noResize="1" noEditPoints="1" noAdjustHandles="1" noChangeArrowheads="1" noChangeShapeType="1" noCrop="1"/>
+          </p:cNvPicPr>
+          <p:nvPr>
+            <p:extLst>
+              <p:ext uri="{386F3935-93C4-4BCD-93E2-E3B085C9AB24}">
+                <p16:designElem xmlns:p16="http://schemas.microsoft.com/office/powerpoint/2015/main" val="1"/>
+              </p:ext>
+            </p:extLst>
+          </p:nvPr>
+        </p:nvPicPr>
+        <p:blipFill rotWithShape="1">
+          <a:blip r:embed="rId2">
+            <a:extLst>
+              <a:ext uri="{28A0092B-C50C-407E-A947-70E740481C1C}">
+                <a14:useLocalDpi xmlns:a14="http://schemas.microsoft.com/office/drawing/2010/main" val="0"/>
+              </a:ext>
+            </a:extLst>
+          </a:blip>
+          <a:srcRect t="1538" b="-1538"/>
+          <a:stretch/>
+        </p:blipFill>
+        <p:spPr bwMode="black">
+          <a:xfrm>
+            <a:off x="0" y="6126480"/>
+            <a:ext cx="12192000" cy="742950"/>
+          </a:xfrm>
+          <a:prstGeom prst="rect">
+            <a:avLst/>
+          </a:prstGeom>
+        </p:spPr>
+      </p:pic>
+      <p:cxnSp>
+        <p:nvCxnSpPr>
+          <p:cNvPr id="41" name="Straight Connector 40">
+            <a:extLst>
+              <a:ext uri="{FF2B5EF4-FFF2-40B4-BE49-F238E27FC236}">
+                <a16:creationId xmlns:a16="http://schemas.microsoft.com/office/drawing/2014/main" id="{45149CE8-68F8-7425-AEAA-6C6E3AF9279E}"/>
+              </a:ext>
+              <a:ext uri="{C183D7F6-B498-43B3-948B-1728B52AA6E4}">
+                <adec:decorative xmlns:adec="http://schemas.microsoft.com/office/drawing/2017/decorative" val="1"/>
+              </a:ext>
+            </a:extLst>
+          </p:cNvPr>
+          <p:cNvCxnSpPr>
+            <a:cxnSpLocks noGrp="1" noRot="1" noChangeAspect="1" noMove="1" noResize="1" noEditPoints="1" noAdjustHandles="1" noChangeArrowheads="1" noChangeShapeType="1"/>
+          </p:cNvCxnSpPr>
+          <p:nvPr>
+            <p:extLst>
+              <p:ext uri="{386F3935-93C4-4BCD-93E2-E3B085C9AB24}">
+                <p16:designElem xmlns:p16="http://schemas.microsoft.com/office/powerpoint/2015/main" val="1"/>
+              </p:ext>
+            </p:extLst>
+          </p:nvPr>
+        </p:nvCxnSpPr>
+        <p:spPr>
+          <a:xfrm>
+            <a:off x="0" y="6128413"/>
+            <a:ext cx="12192000" cy="0"/>
+          </a:xfrm>
+          <a:prstGeom prst="line">
+            <a:avLst/>
+          </a:prstGeom>
+          <a:ln w="12700">
+            <a:solidFill>
+              <a:srgbClr val="000001">
+                <a:alpha val="20000"/>
+              </a:srgbClr>
+            </a:solidFill>
+          </a:ln>
+        </p:spPr>
+        <p:style>
+          <a:lnRef idx="1">
+            <a:schemeClr val="accent1"/>
+          </a:lnRef>
+          <a:fillRef idx="0">
+            <a:schemeClr val="accent1"/>
+          </a:fillRef>
+          <a:effectRef idx="0">
+            <a:schemeClr val="accent1"/>
+          </a:effectRef>
+          <a:fontRef idx="minor">
+            <a:schemeClr val="tx1"/>
+          </a:fontRef>
+        </p:style>
+      </p:cxnSp>
+      <p:cxnSp>
+        <p:nvCxnSpPr>
+          <p:cNvPr id="43" name="Straight Connector 42">
+            <a:extLst>
+              <a:ext uri="{FF2B5EF4-FFF2-40B4-BE49-F238E27FC236}">
+                <a16:creationId xmlns:a16="http://schemas.microsoft.com/office/drawing/2014/main" id="{721F7DF0-3EE1-9E6B-B120-E0DA803FE13B}"/>
+              </a:ext>
+              <a:ext uri="{C183D7F6-B498-43B3-948B-1728B52AA6E4}">
+                <adec:decorative xmlns:adec="http://schemas.microsoft.com/office/drawing/2017/decorative" val="1"/>
+              </a:ext>
+            </a:extLst>
+          </p:cNvPr>
+          <p:cNvCxnSpPr>
+            <a:cxnSpLocks noGrp="1" noRot="1" noChangeAspect="1" noMove="1" noResize="1" noEditPoints="1" noAdjustHandles="1" noChangeArrowheads="1" noChangeShapeType="1"/>
+          </p:cNvCxnSpPr>
+          <p:nvPr>
+            <p:extLst>
+              <p:ext uri="{386F3935-93C4-4BCD-93E2-E3B085C9AB24}">
+                <p16:designElem xmlns:p16="http://schemas.microsoft.com/office/powerpoint/2015/main" val="1"/>
+              </p:ext>
+            </p:extLst>
+          </p:nvPr>
+        </p:nvCxnSpPr>
+        <p:spPr>
+          <a:xfrm>
+            <a:off x="2417780" y="3528542"/>
+            <a:ext cx="8637072" cy="0"/>
+          </a:xfrm>
+          <a:prstGeom prst="line">
+            <a:avLst/>
+          </a:prstGeom>
+          <a:ln w="31750"/>
+        </p:spPr>
+        <p:style>
+          <a:lnRef idx="3">
+            <a:schemeClr val="accent1"/>
+          </a:lnRef>
+          <a:fillRef idx="0">
+            <a:schemeClr val="accent1"/>
+          </a:fillRef>
+          <a:effectRef idx="2">
+            <a:schemeClr val="accent1"/>
+          </a:effectRef>
+          <a:fontRef idx="minor">
+            <a:schemeClr val="tx1"/>
+          </a:fontRef>
+        </p:style>
+      </p:cxnSp>
+      <p:sp useBgFill="1">
+        <p:nvSpPr>
+          <p:cNvPr id="45" name="Rectangle 44">
+            <a:extLst>
+              <a:ext uri="{FF2B5EF4-FFF2-40B4-BE49-F238E27FC236}">
+                <a16:creationId xmlns:a16="http://schemas.microsoft.com/office/drawing/2014/main" id="{F2867BCC-84F6-5244-753C-DC22B900E305}"/>
+              </a:ext>
+              <a:ext uri="{C183D7F6-B498-43B3-948B-1728B52AA6E4}">
+                <adec:decorative xmlns:adec="http://schemas.microsoft.com/office/drawing/2017/decorative" val="1"/>
+              </a:ext>
+            </a:extLst>
+          </p:cNvPr>
+          <p:cNvSpPr>
+            <a:spLocks noGrp="1" noRot="1" noChangeAspect="1" noMove="1" noResize="1" noEditPoints="1" noAdjustHandles="1" noChangeArrowheads="1" noChangeShapeType="1" noTextEdit="1"/>
+          </p:cNvSpPr>
+          <p:nvPr>
+            <p:extLst>
+              <p:ext uri="{386F3935-93C4-4BCD-93E2-E3B085C9AB24}">
+                <p16:designElem xmlns:p16="http://schemas.microsoft.com/office/powerpoint/2015/main" val="1"/>
+              </p:ext>
+            </p:extLst>
+          </p:nvPr>
+        </p:nvSpPr>
+        <p:spPr>
+          <a:xfrm>
+            <a:off x="2" y="0"/>
+            <a:ext cx="12191695" cy="6858000"/>
+          </a:xfrm>
+          <a:prstGeom prst="rect">
+            <a:avLst/>
+          </a:prstGeom>
+          <a:ln>
+            <a:noFill/>
+          </a:ln>
+        </p:spPr>
+        <p:style>
+          <a:lnRef idx="2">
+            <a:schemeClr val="accent1">
+              <a:shade val="50000"/>
+            </a:schemeClr>
+          </a:lnRef>
+          <a:fillRef idx="1">
+            <a:schemeClr val="accent1"/>
+          </a:fillRef>
+          <a:effectRef idx="0">
+            <a:schemeClr val="accent1"/>
+          </a:effectRef>
+          <a:fontRef idx="minor">
+            <a:schemeClr val="lt1"/>
+          </a:fontRef>
+        </p:style>
+        <p:txBody>
+          <a:bodyPr rtlCol="0" anchor="ctr"/>
+          <a:lstStyle/>
+          <a:p>
+            <a:pPr algn="ctr"/>
+            <a:endParaRPr lang="en-US"/>
+          </a:p>
+        </p:txBody>
+      </p:sp>
+      <p:sp>
+        <p:nvSpPr>
+          <p:cNvPr id="47" name="Rectangle 46">
+            <a:extLst>
+              <a:ext uri="{FF2B5EF4-FFF2-40B4-BE49-F238E27FC236}">
+                <a16:creationId xmlns:a16="http://schemas.microsoft.com/office/drawing/2014/main" id="{CD0518F7-0EE9-D927-43FB-47D4E8CBEA45}"/>
+              </a:ext>
+              <a:ext uri="{C183D7F6-B498-43B3-948B-1728B52AA6E4}">
+                <adec:decorative xmlns:adec="http://schemas.microsoft.com/office/drawing/2017/decorative" val="1"/>
+              </a:ext>
+            </a:extLst>
+          </p:cNvPr>
+          <p:cNvSpPr>
+            <a:spLocks noGrp="1" noRot="1" noChangeAspect="1" noMove="1" noResize="1" noEditPoints="1" noAdjustHandles="1" noChangeArrowheads="1" noChangeShapeType="1" noTextEdit="1"/>
+          </p:cNvSpPr>
+          <p:nvPr>
+            <p:extLst>
+              <p:ext uri="{386F3935-93C4-4BCD-93E2-E3B085C9AB24}">
+                <p16:designElem xmlns:p16="http://schemas.microsoft.com/office/powerpoint/2015/main" val="1"/>
+              </p:ext>
+            </p:extLst>
+          </p:nvPr>
+        </p:nvSpPr>
+        <p:spPr>
+          <a:xfrm>
+            <a:off x="0" y="2019476"/>
+            <a:ext cx="12192000" cy="4105941"/>
+          </a:xfrm>
+          <a:prstGeom prst="rect">
+            <a:avLst/>
+          </a:prstGeom>
+          <a:gradFill flip="none" rotWithShape="1">
+            <a:gsLst>
+              <a:gs pos="0">
+                <a:schemeClr val="bg2">
+                  <a:alpha val="0"/>
+                </a:schemeClr>
+              </a:gs>
+              <a:gs pos="100000">
+                <a:schemeClr val="bg2"/>
+              </a:gs>
+            </a:gsLst>
+            <a:lin ang="5400000" scaled="0"/>
+            <a:tileRect/>
+          </a:gradFill>
+          <a:ln>
+            <a:noFill/>
+          </a:ln>
+        </p:spPr>
+        <p:style>
+          <a:lnRef idx="2">
+            <a:schemeClr val="accent1">
+              <a:shade val="50000"/>
+            </a:schemeClr>
+          </a:lnRef>
+          <a:fillRef idx="1">
+            <a:schemeClr val="accent1"/>
+          </a:fillRef>
+          <a:effectRef idx="0">
+            <a:schemeClr val="accent1"/>
+          </a:effectRef>
+          <a:fontRef idx="minor">
+            <a:schemeClr val="lt1"/>
+          </a:fontRef>
+        </p:style>
+        <p:txBody>
+          <a:bodyPr rtlCol="0" anchor="ctr"/>
+          <a:lstStyle/>
+          <a:p>
+            <a:pPr lvl="0" algn="ctr"/>
+            <a:endParaRPr lang="en-US"/>
+          </a:p>
+        </p:txBody>
+      </p:sp>
+      <p:sp>
+        <p:nvSpPr>
+          <p:cNvPr id="6" name="Title 1">
+            <a:extLst>
+              <a:ext uri="{FF2B5EF4-FFF2-40B4-BE49-F238E27FC236}">
+                <a16:creationId xmlns:a16="http://schemas.microsoft.com/office/drawing/2014/main" id="{3B3B3FF4-B89D-8ABC-4EFE-044068CF8697}"/>
+              </a:ext>
+            </a:extLst>
+          </p:cNvPr>
+          <p:cNvSpPr>
+            <a:spLocks noGrp="1"/>
+          </p:cNvSpPr>
+          <p:nvPr>
+            <p:ph type="title"/>
+          </p:nvPr>
+        </p:nvSpPr>
+        <p:spPr>
+          <a:xfrm>
+            <a:off x="118682" y="1111363"/>
+            <a:ext cx="4176384" cy="2380828"/>
+          </a:xfrm>
+        </p:spPr>
+        <p:txBody>
+          <a:bodyPr vert="horz" lIns="91440" tIns="45720" rIns="91440" bIns="0" rtlCol="0" anchor="b">
+            <a:normAutofit fontScale="90000"/>
+          </a:bodyPr>
+          <a:lstStyle/>
+          <a:p>
+            <a:r>
+              <a:rPr lang="en-US" sz="4400" dirty="0"/>
+              <a:t>EXPLORATORY DATA ANALYSIS (EDA) </a:t>
+            </a:r>
+            <a:r>
+              <a:rPr lang="en-GB" sz="4400" dirty="0" err="1"/>
+              <a:t>Multivariative</a:t>
+            </a:r>
+            <a:br>
+              <a:rPr lang="en-GB" sz="4400" dirty="0"/>
+            </a:br>
+            <a:r>
+              <a:rPr lang="en-US" sz="4400" dirty="0"/>
+              <a:t> analysis</a:t>
+            </a:r>
+          </a:p>
+        </p:txBody>
+      </p:sp>
+      <p:cxnSp>
+        <p:nvCxnSpPr>
+          <p:cNvPr id="49" name="Straight Connector 48">
+            <a:extLst>
+              <a:ext uri="{FF2B5EF4-FFF2-40B4-BE49-F238E27FC236}">
+                <a16:creationId xmlns:a16="http://schemas.microsoft.com/office/drawing/2014/main" id="{C456B8F2-F757-8EB2-A8D5-6B1CD79E60DF}"/>
+              </a:ext>
+              <a:ext uri="{C183D7F6-B498-43B3-948B-1728B52AA6E4}">
+                <adec:decorative xmlns:adec="http://schemas.microsoft.com/office/drawing/2017/decorative" val="1"/>
+              </a:ext>
+            </a:extLst>
+          </p:cNvPr>
+          <p:cNvCxnSpPr>
+            <a:cxnSpLocks noGrp="1" noRot="1" noChangeAspect="1" noMove="1" noResize="1" noEditPoints="1" noAdjustHandles="1" noChangeArrowheads="1" noChangeShapeType="1"/>
+          </p:cNvCxnSpPr>
+          <p:nvPr>
+            <p:extLst>
+              <p:ext uri="{386F3935-93C4-4BCD-93E2-E3B085C9AB24}">
+                <p16:designElem xmlns:p16="http://schemas.microsoft.com/office/powerpoint/2015/main" val="1"/>
+              </p:ext>
+            </p:extLst>
+          </p:nvPr>
+        </p:nvCxnSpPr>
+        <p:spPr>
+          <a:xfrm>
+            <a:off x="1452617" y="3528543"/>
+            <a:ext cx="4171479" cy="0"/>
+          </a:xfrm>
+          <a:prstGeom prst="line">
+            <a:avLst/>
+          </a:prstGeom>
+          <a:ln w="31750"/>
+        </p:spPr>
+        <p:style>
+          <a:lnRef idx="3">
+            <a:schemeClr val="accent1"/>
+          </a:lnRef>
+          <a:fillRef idx="0">
+            <a:schemeClr val="accent1"/>
+          </a:fillRef>
+          <a:effectRef idx="2">
+            <a:schemeClr val="accent1"/>
+          </a:effectRef>
+          <a:fontRef idx="minor">
+            <a:schemeClr val="tx1"/>
+          </a:fontRef>
+        </p:style>
+      </p:cxnSp>
+      <p:pic>
+        <p:nvPicPr>
+          <p:cNvPr id="51" name="Picture 50">
+            <a:extLst>
+              <a:ext uri="{FF2B5EF4-FFF2-40B4-BE49-F238E27FC236}">
+                <a16:creationId xmlns:a16="http://schemas.microsoft.com/office/drawing/2014/main" id="{8B8F41FE-A318-486C-9C2E-1AC0A46B1C0C}"/>
+              </a:ext>
+              <a:ext uri="{C183D7F6-B498-43B3-948B-1728B52AA6E4}">
+                <adec:decorative xmlns:adec="http://schemas.microsoft.com/office/drawing/2017/decorative" val="1"/>
+              </a:ext>
+            </a:extLst>
+          </p:cNvPr>
+          <p:cNvPicPr>
+            <a:picLocks noGrp="1" noRot="1" noChangeAspect="1" noMove="1" noResize="1" noEditPoints="1" noAdjustHandles="1" noChangeArrowheads="1" noChangeShapeType="1" noCrop="1"/>
+          </p:cNvPicPr>
+          <p:nvPr>
+            <p:extLst>
+              <p:ext uri="{386F3935-93C4-4BCD-93E2-E3B085C9AB24}">
+                <p16:designElem xmlns:p16="http://schemas.microsoft.com/office/powerpoint/2015/main" val="1"/>
+              </p:ext>
+            </p:extLst>
+          </p:nvPr>
+        </p:nvPicPr>
+        <p:blipFill rotWithShape="1">
+          <a:blip r:embed="rId2">
+            <a:extLst>
+              <a:ext uri="{28A0092B-C50C-407E-A947-70E740481C1C}">
+                <a14:useLocalDpi xmlns:a14="http://schemas.microsoft.com/office/drawing/2010/main" val="0"/>
+              </a:ext>
+            </a:extLst>
+          </a:blip>
+          <a:srcRect t="1538" b="-1538"/>
+          <a:stretch/>
+        </p:blipFill>
+        <p:spPr bwMode="black">
+          <a:xfrm>
+            <a:off x="0" y="6126480"/>
+            <a:ext cx="12192000" cy="742950"/>
+          </a:xfrm>
+          <a:prstGeom prst="rect">
+            <a:avLst/>
+          </a:prstGeom>
+        </p:spPr>
+      </p:pic>
+      <p:cxnSp>
+        <p:nvCxnSpPr>
+          <p:cNvPr id="53" name="Straight Connector 52">
+            <a:extLst>
+              <a:ext uri="{FF2B5EF4-FFF2-40B4-BE49-F238E27FC236}">
+                <a16:creationId xmlns:a16="http://schemas.microsoft.com/office/drawing/2014/main" id="{8E6F5DD5-32CE-29E0-419F-69461AAC5290}"/>
+              </a:ext>
+              <a:ext uri="{C183D7F6-B498-43B3-948B-1728B52AA6E4}">
+                <adec:decorative xmlns:adec="http://schemas.microsoft.com/office/drawing/2017/decorative" val="1"/>
+              </a:ext>
+            </a:extLst>
+          </p:cNvPr>
+          <p:cNvCxnSpPr>
+            <a:cxnSpLocks noGrp="1" noRot="1" noChangeAspect="1" noMove="1" noResize="1" noEditPoints="1" noAdjustHandles="1" noChangeArrowheads="1" noChangeShapeType="1"/>
+          </p:cNvCxnSpPr>
+          <p:nvPr>
+            <p:extLst>
+              <p:ext uri="{386F3935-93C4-4BCD-93E2-E3B085C9AB24}">
+                <p16:designElem xmlns:p16="http://schemas.microsoft.com/office/powerpoint/2015/main" val="1"/>
+              </p:ext>
+            </p:extLst>
+          </p:nvPr>
+        </p:nvCxnSpPr>
+        <p:spPr>
+          <a:xfrm>
+            <a:off x="0" y="6128413"/>
+            <a:ext cx="12192000" cy="0"/>
+          </a:xfrm>
+          <a:prstGeom prst="line">
+            <a:avLst/>
+          </a:prstGeom>
+          <a:ln w="12700">
+            <a:solidFill>
+              <a:srgbClr val="000001">
+                <a:alpha val="20000"/>
+              </a:srgbClr>
+            </a:solidFill>
+          </a:ln>
+        </p:spPr>
+        <p:style>
+          <a:lnRef idx="1">
+            <a:schemeClr val="accent1"/>
+          </a:lnRef>
+          <a:fillRef idx="0">
+            <a:schemeClr val="accent1"/>
+          </a:fillRef>
+          <a:effectRef idx="0">
+            <a:schemeClr val="accent1"/>
+          </a:effectRef>
+          <a:fontRef idx="minor">
+            <a:schemeClr val="tx1"/>
+          </a:fontRef>
+        </p:style>
+      </p:cxnSp>
+      <p:pic>
+        <p:nvPicPr>
+          <p:cNvPr id="3" name="Picture 2" descr="A screenshot of a graph&#10;&#10;Description automatically generated">
+            <a:extLst>
+              <a:ext uri="{FF2B5EF4-FFF2-40B4-BE49-F238E27FC236}">
+                <a16:creationId xmlns:a16="http://schemas.microsoft.com/office/drawing/2014/main" id="{CF837BBB-EE0E-8D4E-7EB8-57B3EAE7080F}"/>
+              </a:ext>
+            </a:extLst>
+          </p:cNvPr>
+          <p:cNvPicPr>
+            <a:picLocks noChangeAspect="1"/>
+          </p:cNvPicPr>
+          <p:nvPr/>
+        </p:nvPicPr>
+        <p:blipFill>
+          <a:blip r:embed="rId3"/>
+          <a:stretch>
+            <a:fillRect/>
+          </a:stretch>
+        </p:blipFill>
+        <p:spPr>
+          <a:xfrm>
+            <a:off x="4091871" y="257374"/>
+            <a:ext cx="7981447" cy="4856879"/>
+          </a:xfrm>
+          <a:prstGeom prst="rect">
+            <a:avLst/>
+          </a:prstGeom>
+        </p:spPr>
+      </p:pic>
+    </p:spTree>
+    <p:extLst>
+      <p:ext uri="{BB962C8B-B14F-4D97-AF65-F5344CB8AC3E}">
+        <p14:creationId xmlns:p14="http://schemas.microsoft.com/office/powerpoint/2010/main" val="4001812197"/>
+      </p:ext>
+    </p:extLst>
+  </p:cSld>
+  <p:clrMapOvr>
+    <a:masterClrMapping/>
+  </p:clrMapOvr>
+</p:sld>
+</file>
+
+<file path=ppt/slides/slide8.xml><?xml version="1.0" encoding="utf-8"?>
+<p:sld xmlns:a="http://schemas.openxmlformats.org/drawingml/2006/main" xmlns:r="http://schemas.openxmlformats.org/officeDocument/2006/relationships" xmlns:p="http://schemas.openxmlformats.org/presentationml/2006/main">
+  <p:cSld>
+    <p:bg>
+      <p:bgPr>
+        <a:gradFill rotWithShape="1">
+          <a:gsLst>
+            <a:gs pos="0">
+              <a:schemeClr val="bg2">
+                <a:tint val="94000"/>
+                <a:satMod val="80000"/>
+                <a:lumMod val="106000"/>
+              </a:schemeClr>
+            </a:gs>
+            <a:gs pos="100000">
+              <a:schemeClr val="bg2">
+                <a:shade val="80000"/>
+              </a:schemeClr>
+            </a:gs>
+          </a:gsLst>
+          <a:path path="circle">
+            <a:fillToRect l="43000" r="43000" b="100000"/>
+          </a:path>
+        </a:gradFill>
+        <a:effectLst/>
+      </p:bgPr>
+    </p:bg>
+    <p:spTree>
+      <p:nvGrpSpPr>
+        <p:cNvPr id="1" name="">
+          <a:extLst>
+            <a:ext uri="{FF2B5EF4-FFF2-40B4-BE49-F238E27FC236}">
+              <a16:creationId xmlns:a16="http://schemas.microsoft.com/office/drawing/2014/main" id="{24CAF90F-D868-9B5C-C3C2-AB2938E085FF}"/>
+            </a:ext>
+          </a:extLst>
+        </p:cNvPr>
+        <p:cNvGrpSpPr/>
+        <p:nvPr/>
+      </p:nvGrpSpPr>
+      <p:grpSpPr>
+        <a:xfrm>
+          <a:off x="0" y="0"/>
+          <a:ext cx="0" cy="0"/>
+          <a:chOff x="0" y="0"/>
+          <a:chExt cx="0" cy="0"/>
+        </a:xfrm>
+      </p:grpSpPr>
+      <p:sp>
+        <p:nvSpPr>
+          <p:cNvPr id="101" name="Rectangle 100">
+            <a:extLst>
+              <a:ext uri="{FF2B5EF4-FFF2-40B4-BE49-F238E27FC236}">
+                <a16:creationId xmlns:a16="http://schemas.microsoft.com/office/drawing/2014/main" id="{0CABCAE3-64FC-4149-819F-2C1812824154}"/>
+              </a:ext>
+              <a:ext uri="{C183D7F6-B498-43B3-948B-1728B52AA6E4}">
+                <adec:decorative xmlns:adec="http://schemas.microsoft.com/office/drawing/2017/decorative" val="1"/>
+              </a:ext>
+            </a:extLst>
+          </p:cNvPr>
+          <p:cNvSpPr>
+            <a:spLocks noGrp="1" noRot="1" noChangeAspect="1" noMove="1" noResize="1" noEditPoints="1" noAdjustHandles="1" noChangeArrowheads="1" noChangeShapeType="1" noTextEdit="1"/>
+          </p:cNvSpPr>
+          <p:nvPr>
+            <p:extLst>
+              <p:ext uri="{386F3935-93C4-4BCD-93E2-E3B085C9AB24}">
+                <p16:designElem xmlns:p16="http://schemas.microsoft.com/office/powerpoint/2015/main" val="1"/>
+              </p:ext>
+            </p:extLst>
+          </p:nvPr>
+        </p:nvSpPr>
+        <p:spPr>
+          <a:xfrm>
+            <a:off x="0" y="2019476"/>
+            <a:ext cx="12192000" cy="4105941"/>
+          </a:xfrm>
+          <a:prstGeom prst="rect">
+            <a:avLst/>
+          </a:prstGeom>
+          <a:gradFill flip="none" rotWithShape="1">
+            <a:gsLst>
+              <a:gs pos="0">
+                <a:schemeClr val="bg2">
+                  <a:alpha val="0"/>
+                </a:schemeClr>
+              </a:gs>
+              <a:gs pos="100000">
+                <a:schemeClr val="bg2"/>
+              </a:gs>
+            </a:gsLst>
+            <a:lin ang="5400000" scaled="0"/>
+            <a:tileRect/>
+          </a:gradFill>
+          <a:ln>
+            <a:noFill/>
+          </a:ln>
+        </p:spPr>
+        <p:style>
+          <a:lnRef idx="2">
+            <a:schemeClr val="accent1">
+              <a:shade val="50000"/>
+            </a:schemeClr>
+          </a:lnRef>
+          <a:fillRef idx="1">
+            <a:schemeClr val="accent1"/>
+          </a:fillRef>
+          <a:effectRef idx="0">
+            <a:schemeClr val="accent1"/>
+          </a:effectRef>
+          <a:fontRef idx="minor">
+            <a:schemeClr val="lt1"/>
+          </a:fontRef>
+        </p:style>
+        <p:txBody>
+          <a:bodyPr/>
+          <a:lstStyle/>
+          <a:p>
+            <a:endParaRPr lang="en-KE"/>
+          </a:p>
+        </p:txBody>
+      </p:sp>
+      <p:pic>
+        <p:nvPicPr>
+          <p:cNvPr id="102" name="Picture 101">
+            <a:extLst>
+              <a:ext uri="{FF2B5EF4-FFF2-40B4-BE49-F238E27FC236}">
+                <a16:creationId xmlns:a16="http://schemas.microsoft.com/office/drawing/2014/main" id="{012FDCFE-9AD2-4D8A-8CBF-B3AA37EBF6DD}"/>
+              </a:ext>
+              <a:ext uri="{C183D7F6-B498-43B3-948B-1728B52AA6E4}">
+                <adec:decorative xmlns:adec="http://schemas.microsoft.com/office/drawing/2017/decorative" val="1"/>
+              </a:ext>
+            </a:extLst>
+          </p:cNvPr>
+          <p:cNvPicPr>
+            <a:picLocks noGrp="1" noRot="1" noChangeAspect="1" noMove="1" noResize="1" noEditPoints="1" noAdjustHandles="1" noChangeArrowheads="1" noChangeShapeType="1" noCrop="1"/>
+          </p:cNvPicPr>
+          <p:nvPr>
+            <p:extLst>
+              <p:ext uri="{386F3935-93C4-4BCD-93E2-E3B085C9AB24}">
+                <p16:designElem xmlns:p16="http://schemas.microsoft.com/office/powerpoint/2015/main" val="1"/>
+              </p:ext>
+            </p:extLst>
+          </p:nvPr>
+        </p:nvPicPr>
+        <p:blipFill rotWithShape="1">
+          <a:blip r:embed="rId2">
+            <a:extLst>
+              <a:ext uri="{28A0092B-C50C-407E-A947-70E740481C1C}">
+                <a14:useLocalDpi xmlns:a14="http://schemas.microsoft.com/office/drawing/2010/main" val="0"/>
+              </a:ext>
+            </a:extLst>
+          </a:blip>
+          <a:srcRect t="1538" b="-1538"/>
+          <a:stretch/>
+        </p:blipFill>
+        <p:spPr bwMode="black">
+          <a:xfrm>
+            <a:off x="0" y="6126480"/>
+            <a:ext cx="12192000" cy="742950"/>
+          </a:xfrm>
+          <a:prstGeom prst="rect">
+            <a:avLst/>
+          </a:prstGeom>
+        </p:spPr>
+      </p:pic>
+      <p:cxnSp>
+        <p:nvCxnSpPr>
+          <p:cNvPr id="103" name="Straight Connector 102">
+            <a:extLst>
+              <a:ext uri="{FF2B5EF4-FFF2-40B4-BE49-F238E27FC236}">
+                <a16:creationId xmlns:a16="http://schemas.microsoft.com/office/drawing/2014/main" id="{FBD463FC-4CA8-4FF4-85A3-AF9F4B98D210}"/>
+              </a:ext>
+              <a:ext uri="{C183D7F6-B498-43B3-948B-1728B52AA6E4}">
+                <adec:decorative xmlns:adec="http://schemas.microsoft.com/office/drawing/2017/decorative" val="1"/>
+              </a:ext>
+            </a:extLst>
+          </p:cNvPr>
+          <p:cNvCxnSpPr>
+            <a:cxnSpLocks noGrp="1" noRot="1" noChangeAspect="1" noMove="1" noResize="1" noEditPoints="1" noAdjustHandles="1" noChangeArrowheads="1" noChangeShapeType="1"/>
+          </p:cNvCxnSpPr>
+          <p:nvPr>
+            <p:extLst>
+              <p:ext uri="{386F3935-93C4-4BCD-93E2-E3B085C9AB24}">
+                <p16:designElem xmlns:p16="http://schemas.microsoft.com/office/powerpoint/2015/main" val="1"/>
+              </p:ext>
+            </p:extLst>
+          </p:nvPr>
+        </p:nvCxnSpPr>
+        <p:spPr>
+          <a:xfrm>
+            <a:off x="0" y="6128413"/>
+            <a:ext cx="12192000" cy="0"/>
+          </a:xfrm>
+          <a:prstGeom prst="line">
+            <a:avLst/>
+          </a:prstGeom>
+          <a:ln w="12700">
+            <a:solidFill>
+              <a:srgbClr val="000001">
+                <a:alpha val="20000"/>
+              </a:srgbClr>
+            </a:solidFill>
+          </a:ln>
+        </p:spPr>
+        <p:style>
+          <a:lnRef idx="1">
+            <a:schemeClr val="accent1"/>
+          </a:lnRef>
+          <a:fillRef idx="0">
+            <a:schemeClr val="accent1"/>
+          </a:fillRef>
+          <a:effectRef idx="0">
+            <a:schemeClr val="accent1"/>
+          </a:effectRef>
+          <a:fontRef idx="minor">
+            <a:schemeClr val="tx1"/>
+          </a:fontRef>
+        </p:style>
+      </p:cxnSp>
+      <p:cxnSp>
+        <p:nvCxnSpPr>
+          <p:cNvPr id="104" name="Straight Connector 103">
+            <a:extLst>
+              <a:ext uri="{FF2B5EF4-FFF2-40B4-BE49-F238E27FC236}">
+                <a16:creationId xmlns:a16="http://schemas.microsoft.com/office/drawing/2014/main" id="{BECF35C3-8B44-4F4B-BD25-4C01823DB22A}"/>
+              </a:ext>
+              <a:ext uri="{C183D7F6-B498-43B3-948B-1728B52AA6E4}">
+                <adec:decorative xmlns:adec="http://schemas.microsoft.com/office/drawing/2017/decorative" val="1"/>
+              </a:ext>
+            </a:extLst>
+          </p:cNvPr>
+          <p:cNvCxnSpPr>
+            <a:cxnSpLocks noGrp="1" noRot="1" noChangeAspect="1" noMove="1" noResize="1" noEditPoints="1" noAdjustHandles="1" noChangeArrowheads="1" noChangeShapeType="1"/>
+          </p:cNvCxnSpPr>
+          <p:nvPr>
+            <p:extLst>
+              <p:ext uri="{386F3935-93C4-4BCD-93E2-E3B085C9AB24}">
+                <p16:designElem xmlns:p16="http://schemas.microsoft.com/office/powerpoint/2015/main" val="1"/>
+              </p:ext>
+            </p:extLst>
+          </p:nvPr>
+        </p:nvCxnSpPr>
+        <p:spPr>
+          <a:xfrm>
+            <a:off x="2417780" y="3528542"/>
+            <a:ext cx="8637072" cy="0"/>
+          </a:xfrm>
+          <a:prstGeom prst="line">
+            <a:avLst/>
+          </a:prstGeom>
+          <a:ln w="31750"/>
+        </p:spPr>
+        <p:style>
+          <a:lnRef idx="3">
+            <a:schemeClr val="accent1"/>
+          </a:lnRef>
+          <a:fillRef idx="0">
+            <a:schemeClr val="accent1"/>
+          </a:fillRef>
+          <a:effectRef idx="2">
+            <a:schemeClr val="accent1"/>
+          </a:effectRef>
+          <a:fontRef idx="minor">
+            <a:schemeClr val="tx1"/>
+          </a:fontRef>
+        </p:style>
+      </p:cxnSp>
+      <p:sp useBgFill="1">
+        <p:nvSpPr>
+          <p:cNvPr id="105" name="Rectangle 104">
+            <a:extLst>
+              <a:ext uri="{FF2B5EF4-FFF2-40B4-BE49-F238E27FC236}">
+                <a16:creationId xmlns:a16="http://schemas.microsoft.com/office/drawing/2014/main" id="{8BC298DB-2D5C-40A1-9A78-6B4A12198A9B}"/>
+              </a:ext>
+              <a:ext uri="{C183D7F6-B498-43B3-948B-1728B52AA6E4}">
+                <adec:decorative xmlns:adec="http://schemas.microsoft.com/office/drawing/2017/decorative" val="1"/>
+              </a:ext>
+            </a:extLst>
+          </p:cNvPr>
+          <p:cNvSpPr>
+            <a:spLocks noGrp="1" noRot="1" noChangeAspect="1" noMove="1" noResize="1" noEditPoints="1" noAdjustHandles="1" noChangeArrowheads="1" noChangeShapeType="1" noTextEdit="1"/>
+          </p:cNvSpPr>
+          <p:nvPr>
+            <p:extLst>
+              <p:ext uri="{386F3935-93C4-4BCD-93E2-E3B085C9AB24}">
+                <p16:designElem xmlns:p16="http://schemas.microsoft.com/office/powerpoint/2015/main" val="1"/>
+              </p:ext>
+            </p:extLst>
+          </p:nvPr>
+        </p:nvSpPr>
+        <p:spPr>
+          <a:xfrm>
+            <a:off x="2" y="0"/>
+            <a:ext cx="12191695" cy="6858000"/>
+          </a:xfrm>
+          <a:prstGeom prst="rect">
+            <a:avLst/>
+          </a:prstGeom>
+          <a:ln>
+            <a:noFill/>
+          </a:ln>
+        </p:spPr>
+        <p:style>
+          <a:lnRef idx="2">
+            <a:schemeClr val="accent1">
+              <a:shade val="50000"/>
+            </a:schemeClr>
+          </a:lnRef>
+          <a:fillRef idx="1">
+            <a:schemeClr val="accent1"/>
+          </a:fillRef>
+          <a:effectRef idx="0">
+            <a:schemeClr val="accent1"/>
+          </a:effectRef>
+          <a:fontRef idx="minor">
+            <a:schemeClr val="lt1"/>
+          </a:fontRef>
+        </p:style>
+        <p:txBody>
+          <a:bodyPr rtlCol="0" anchor="ctr"/>
+          <a:lstStyle/>
+          <a:p>
+            <a:pPr algn="ctr"/>
+            <a:endParaRPr lang="en-US"/>
+          </a:p>
+        </p:txBody>
+      </p:sp>
+      <p:sp>
+        <p:nvSpPr>
+          <p:cNvPr id="106" name="Rectangle 105">
+            <a:extLst>
+              <a:ext uri="{FF2B5EF4-FFF2-40B4-BE49-F238E27FC236}">
+                <a16:creationId xmlns:a16="http://schemas.microsoft.com/office/drawing/2014/main" id="{35C2355B-7CE9-4192-9142-A41CA0A0C08B}"/>
+              </a:ext>
+              <a:ext uri="{C183D7F6-B498-43B3-948B-1728B52AA6E4}">
+                <adec:decorative xmlns:adec="http://schemas.microsoft.com/office/drawing/2017/decorative" val="1"/>
+              </a:ext>
+            </a:extLst>
+          </p:cNvPr>
+          <p:cNvSpPr>
+            <a:spLocks noGrp="1" noRot="1" noChangeAspect="1" noMove="1" noResize="1" noEditPoints="1" noAdjustHandles="1" noChangeArrowheads="1" noChangeShapeType="1" noTextEdit="1"/>
+          </p:cNvSpPr>
+          <p:nvPr>
+            <p:extLst>
+              <p:ext uri="{386F3935-93C4-4BCD-93E2-E3B085C9AB24}">
+                <p16:designElem xmlns:p16="http://schemas.microsoft.com/office/powerpoint/2015/main" val="1"/>
+              </p:ext>
+            </p:extLst>
+          </p:nvPr>
+        </p:nvSpPr>
+        <p:spPr>
+          <a:xfrm>
+            <a:off x="0" y="2019476"/>
+            <a:ext cx="12192000" cy="4105941"/>
+          </a:xfrm>
+          <a:prstGeom prst="rect">
+            <a:avLst/>
+          </a:prstGeom>
+          <a:gradFill flip="none" rotWithShape="1">
+            <a:gsLst>
+              <a:gs pos="0">
+                <a:schemeClr val="bg2">
+                  <a:alpha val="0"/>
+                </a:schemeClr>
+              </a:gs>
+              <a:gs pos="100000">
+                <a:schemeClr val="bg2"/>
+              </a:gs>
+            </a:gsLst>
+            <a:lin ang="5400000" scaled="0"/>
+            <a:tileRect/>
+          </a:gradFill>
+          <a:ln>
+            <a:noFill/>
+          </a:ln>
+        </p:spPr>
+        <p:style>
+          <a:lnRef idx="2">
+            <a:schemeClr val="accent1">
+              <a:shade val="50000"/>
+            </a:schemeClr>
+          </a:lnRef>
+          <a:fillRef idx="1">
+            <a:schemeClr val="accent1"/>
+          </a:fillRef>
+          <a:effectRef idx="0">
+            <a:schemeClr val="accent1"/>
+          </a:effectRef>
+          <a:fontRef idx="minor">
+            <a:schemeClr val="lt1"/>
+          </a:fontRef>
+        </p:style>
+        <p:txBody>
+          <a:bodyPr rtlCol="0" anchor="ctr"/>
+          <a:lstStyle/>
+          <a:p>
+            <a:pPr lvl="0" algn="ctr"/>
+            <a:endParaRPr lang="en-US"/>
+          </a:p>
+        </p:txBody>
+      </p:sp>
+      <p:sp>
+        <p:nvSpPr>
+          <p:cNvPr id="6" name="Title 1">
+            <a:extLst>
+              <a:ext uri="{FF2B5EF4-FFF2-40B4-BE49-F238E27FC236}">
+                <a16:creationId xmlns:a16="http://schemas.microsoft.com/office/drawing/2014/main" id="{9C84DC9E-EC31-6022-A7C2-1586E9D02755}"/>
+              </a:ext>
+            </a:extLst>
+          </p:cNvPr>
+          <p:cNvSpPr>
+            <a:spLocks noGrp="1"/>
+          </p:cNvSpPr>
+          <p:nvPr>
+            <p:ph type="title"/>
+          </p:nvPr>
+        </p:nvSpPr>
+        <p:spPr>
+          <a:xfrm>
+            <a:off x="7883913" y="943660"/>
+            <a:ext cx="4151306" cy="2374516"/>
+          </a:xfrm>
+        </p:spPr>
+        <p:txBody>
+          <a:bodyPr vert="horz" lIns="91440" tIns="45720" rIns="91440" bIns="0" rtlCol="0" anchor="b">
+            <a:noAutofit/>
+          </a:bodyPr>
+          <a:lstStyle/>
+          <a:p>
+            <a:pPr algn="r"/>
+            <a:r>
+              <a:rPr lang="en-US" sz="3600" dirty="0"/>
+              <a:t>EXPLORATORY DATA ANALYSIS (EDA) </a:t>
+            </a:r>
+            <a:r>
+              <a:rPr lang="en-US" sz="3600" dirty="0" err="1"/>
+              <a:t>Multivariative</a:t>
+            </a:r>
+            <a:br>
+              <a:rPr lang="en-US" sz="3600" dirty="0"/>
+            </a:br>
+            <a:r>
+              <a:rPr lang="en-US" sz="3600" dirty="0"/>
+              <a:t> analysis</a:t>
+            </a:r>
+          </a:p>
+        </p:txBody>
+      </p:sp>
+      <p:pic>
+        <p:nvPicPr>
+          <p:cNvPr id="3" name="Picture 2" descr="A graph of different colored dots&#10;&#10;Description automatically generated">
+            <a:extLst>
+              <a:ext uri="{FF2B5EF4-FFF2-40B4-BE49-F238E27FC236}">
+                <a16:creationId xmlns:a16="http://schemas.microsoft.com/office/drawing/2014/main" id="{9E0FC10C-DF1C-B144-A60F-FD98B32F8C51}"/>
+              </a:ext>
+            </a:extLst>
+          </p:cNvPr>
+          <p:cNvPicPr>
+            <a:picLocks noChangeAspect="1"/>
+          </p:cNvPicPr>
+          <p:nvPr/>
+        </p:nvPicPr>
+        <p:blipFill>
+          <a:blip r:embed="rId3"/>
+          <a:stretch>
+            <a:fillRect/>
+          </a:stretch>
+        </p:blipFill>
+        <p:spPr>
+          <a:xfrm>
+            <a:off x="63954" y="138990"/>
+            <a:ext cx="7732201" cy="5257896"/>
+          </a:xfrm>
+          <a:prstGeom prst="rect">
+            <a:avLst/>
+          </a:prstGeom>
+        </p:spPr>
+      </p:pic>
+      <p:cxnSp>
+        <p:nvCxnSpPr>
+          <p:cNvPr id="107" name="Straight Connector 106">
+            <a:extLst>
+              <a:ext uri="{FF2B5EF4-FFF2-40B4-BE49-F238E27FC236}">
+                <a16:creationId xmlns:a16="http://schemas.microsoft.com/office/drawing/2014/main" id="{06D05ED8-39E4-42F8-92CB-704C2BD0D215}"/>
+              </a:ext>
+              <a:ext uri="{C183D7F6-B498-43B3-948B-1728B52AA6E4}">
+                <adec:decorative xmlns:adec="http://schemas.microsoft.com/office/drawing/2017/decorative" val="1"/>
+              </a:ext>
+            </a:extLst>
+          </p:cNvPr>
+          <p:cNvCxnSpPr>
+            <a:cxnSpLocks noGrp="1" noRot="1" noChangeAspect="1" noMove="1" noResize="1" noEditPoints="1" noAdjustHandles="1" noChangeArrowheads="1" noChangeShapeType="1"/>
+          </p:cNvCxnSpPr>
+          <p:nvPr>
+            <p:extLst>
+              <p:ext uri="{386F3935-93C4-4BCD-93E2-E3B085C9AB24}">
+                <p16:designElem xmlns:p16="http://schemas.microsoft.com/office/powerpoint/2015/main" val="1"/>
+              </p:ext>
+            </p:extLst>
+          </p:nvPr>
+        </p:nvCxnSpPr>
+        <p:spPr>
+          <a:xfrm>
+            <a:off x="6579647" y="3526496"/>
+            <a:ext cx="4149931" cy="0"/>
+          </a:xfrm>
+          <a:prstGeom prst="line">
+            <a:avLst/>
+          </a:prstGeom>
+          <a:ln w="31750"/>
+        </p:spPr>
+        <p:style>
+          <a:lnRef idx="3">
+            <a:schemeClr val="accent1"/>
+          </a:lnRef>
+          <a:fillRef idx="0">
+            <a:schemeClr val="accent1"/>
+          </a:fillRef>
+          <a:effectRef idx="2">
+            <a:schemeClr val="accent1"/>
+          </a:effectRef>
+          <a:fontRef idx="minor">
+            <a:schemeClr val="tx1"/>
+          </a:fontRef>
+        </p:style>
+      </p:cxnSp>
+      <p:pic>
+        <p:nvPicPr>
+          <p:cNvPr id="108" name="Picture 107">
+            <a:extLst>
+              <a:ext uri="{FF2B5EF4-FFF2-40B4-BE49-F238E27FC236}">
+                <a16:creationId xmlns:a16="http://schemas.microsoft.com/office/drawing/2014/main" id="{45CE2E7C-6AA3-4710-825D-4CDDF788C7BC}"/>
+              </a:ext>
+              <a:ext uri="{C183D7F6-B498-43B3-948B-1728B52AA6E4}">
+                <adec:decorative xmlns:adec="http://schemas.microsoft.com/office/drawing/2017/decorative" val="1"/>
+              </a:ext>
+            </a:extLst>
+          </p:cNvPr>
+          <p:cNvPicPr>
+            <a:picLocks noGrp="1" noRot="1" noChangeAspect="1" noMove="1" noResize="1" noEditPoints="1" noAdjustHandles="1" noChangeArrowheads="1" noChangeShapeType="1" noCrop="1"/>
+          </p:cNvPicPr>
+          <p:nvPr>
+            <p:extLst>
+              <p:ext uri="{386F3935-93C4-4BCD-93E2-E3B085C9AB24}">
+                <p16:designElem xmlns:p16="http://schemas.microsoft.com/office/powerpoint/2015/main" val="1"/>
+              </p:ext>
+            </p:extLst>
+          </p:nvPr>
+        </p:nvPicPr>
+        <p:blipFill rotWithShape="1">
+          <a:blip r:embed="rId2">
+            <a:extLst>
+              <a:ext uri="{28A0092B-C50C-407E-A947-70E740481C1C}">
+                <a14:useLocalDpi xmlns:a14="http://schemas.microsoft.com/office/drawing/2010/main" val="0"/>
+              </a:ext>
+            </a:extLst>
+          </a:blip>
+          <a:srcRect t="1538" b="-1538"/>
+          <a:stretch/>
+        </p:blipFill>
+        <p:spPr bwMode="black">
+          <a:xfrm>
+            <a:off x="0" y="6126480"/>
+            <a:ext cx="12192000" cy="742950"/>
+          </a:xfrm>
+          <a:prstGeom prst="rect">
+            <a:avLst/>
+          </a:prstGeom>
+        </p:spPr>
+      </p:pic>
+      <p:cxnSp>
+        <p:nvCxnSpPr>
+          <p:cNvPr id="109" name="Straight Connector 108">
+            <a:extLst>
+              <a:ext uri="{FF2B5EF4-FFF2-40B4-BE49-F238E27FC236}">
+                <a16:creationId xmlns:a16="http://schemas.microsoft.com/office/drawing/2014/main" id="{3256C6C3-0EDC-4651-AB37-9F26CFAA6C86}"/>
+              </a:ext>
+              <a:ext uri="{C183D7F6-B498-43B3-948B-1728B52AA6E4}">
+                <adec:decorative xmlns:adec="http://schemas.microsoft.com/office/drawing/2017/decorative" val="1"/>
+              </a:ext>
+            </a:extLst>
+          </p:cNvPr>
+          <p:cNvCxnSpPr>
+            <a:cxnSpLocks noGrp="1" noRot="1" noChangeAspect="1" noMove="1" noResize="1" noEditPoints="1" noAdjustHandles="1" noChangeArrowheads="1" noChangeShapeType="1"/>
+          </p:cNvCxnSpPr>
+          <p:nvPr>
+            <p:extLst>
+              <p:ext uri="{386F3935-93C4-4BCD-93E2-E3B085C9AB24}">
+                <p16:designElem xmlns:p16="http://schemas.microsoft.com/office/powerpoint/2015/main" val="1"/>
+              </p:ext>
+            </p:extLst>
+          </p:nvPr>
+        </p:nvCxnSpPr>
+        <p:spPr>
+          <a:xfrm>
+            <a:off x="0" y="6128413"/>
+            <a:ext cx="12192000" cy="0"/>
+          </a:xfrm>
+          <a:prstGeom prst="line">
+            <a:avLst/>
+          </a:prstGeom>
+          <a:ln w="12700">
+            <a:solidFill>
+              <a:srgbClr val="000001">
+                <a:alpha val="20000"/>
+              </a:srgbClr>
+            </a:solidFill>
+          </a:ln>
+        </p:spPr>
+        <p:style>
+          <a:lnRef idx="1">
+            <a:schemeClr val="accent1"/>
+          </a:lnRef>
+          <a:fillRef idx="0">
+            <a:schemeClr val="accent1"/>
+          </a:fillRef>
+          <a:effectRef idx="0">
+            <a:schemeClr val="accent1"/>
+          </a:effectRef>
+          <a:fontRef idx="minor">
+            <a:schemeClr val="tx1"/>
+          </a:fontRef>
+        </p:style>
+      </p:cxnSp>
+    </p:spTree>
+    <p:extLst>
+      <p:ext uri="{BB962C8B-B14F-4D97-AF65-F5344CB8AC3E}">
+        <p14:creationId xmlns:p14="http://schemas.microsoft.com/office/powerpoint/2010/main" val="2929152087"/>
+      </p:ext>
+    </p:extLst>
+  </p:cSld>
+  <p:clrMapOvr>
+    <a:masterClrMapping/>
+  </p:clrMapOvr>
+</p:sld>
+</file>
+
+<file path=ppt/slides/slide9.xml><?xml version="1.0" encoding="utf-8"?>
+<p:sld xmlns:a="http://schemas.openxmlformats.org/drawingml/2006/main" xmlns:r="http://schemas.openxmlformats.org/officeDocument/2006/relationships" xmlns:p="http://schemas.openxmlformats.org/presentationml/2006/main">
+  <p:cSld>
+    <p:spTree>
+      <p:nvGrpSpPr>
+        <p:cNvPr id="1" name=""/>
+        <p:cNvGrpSpPr/>
+        <p:nvPr/>
+      </p:nvGrpSpPr>
+      <p:grpSpPr>
+        <a:xfrm>
+          <a:off x="0" y="0"/>
+          <a:ext cx="0" cy="0"/>
+          <a:chOff x="0" y="0"/>
+          <a:chExt cx="0" cy="0"/>
+        </a:xfrm>
+      </p:grpSpPr>
+      <p:sp>
+        <p:nvSpPr>
+          <p:cNvPr id="3" name="Title 2">
+            <a:extLst>
+              <a:ext uri="{FF2B5EF4-FFF2-40B4-BE49-F238E27FC236}">
+                <a16:creationId xmlns:a16="http://schemas.microsoft.com/office/drawing/2014/main" id="{C8F51C52-1652-952E-BC52-68470BCB0A2D}"/>
+              </a:ext>
+            </a:extLst>
+          </p:cNvPr>
+          <p:cNvSpPr>
+            <a:spLocks noGrp="1"/>
+          </p:cNvSpPr>
+          <p:nvPr>
+            <p:ph type="title"/>
+          </p:nvPr>
+        </p:nvSpPr>
+        <p:spPr/>
+        <p:txBody>
+          <a:bodyPr/>
+          <a:lstStyle/>
+          <a:p>
+            <a:r>
+              <a:rPr lang="en-KE" dirty="0"/>
+              <a:t>MODELING APROACH &amp; EVAPUATION METRICS</a:t>
+            </a:r>
+          </a:p>
+        </p:txBody>
+      </p:sp>
+      <p:sp>
+        <p:nvSpPr>
+          <p:cNvPr id="4" name="Content Placeholder 3">
+            <a:extLst>
+              <a:ext uri="{FF2B5EF4-FFF2-40B4-BE49-F238E27FC236}">
+                <a16:creationId xmlns:a16="http://schemas.microsoft.com/office/drawing/2014/main" id="{D81F2E08-9524-FBD1-7ABA-0ACEDBA7AD62}"/>
+              </a:ext>
+            </a:extLst>
+          </p:cNvPr>
+          <p:cNvSpPr>
+            <a:spLocks noGrp="1"/>
+          </p:cNvSpPr>
+          <p:nvPr>
+            <p:ph idx="1"/>
+          </p:nvPr>
+        </p:nvSpPr>
+        <p:spPr/>
+        <p:txBody>
+          <a:bodyPr>
+            <a:normAutofit fontScale="77500" lnSpcReduction="20000"/>
+          </a:bodyPr>
+          <a:lstStyle/>
+          <a:p>
+            <a:pPr marL="0" indent="0" algn="l">
+              <a:spcAft>
+                <a:spcPts val="450"/>
+              </a:spcAft>
+              <a:buNone/>
+            </a:pPr>
+            <a:r>
+              <a:rPr lang="en-GB" dirty="0">
+                <a:latin typeface="Roboto" panose="02000000000000000000" pitchFamily="2" charset="0"/>
+              </a:rPr>
+              <a:t>Models tested include: Gradient Boosting, Random Forest, Lasso Logic Regression, Decision Tree, Ridge Classifier,  </a:t>
+            </a:r>
+          </a:p>
+          <a:p>
+            <a:pPr marL="0" indent="0" algn="l">
+              <a:spcAft>
+                <a:spcPts val="450"/>
+              </a:spcAft>
+              <a:buNone/>
+            </a:pPr>
+            <a:r>
+              <a:rPr lang="en-GB" b="0" i="0" dirty="0">
+                <a:effectLst/>
+                <a:latin typeface="Roboto" panose="02000000000000000000" pitchFamily="2" charset="0"/>
+              </a:rPr>
+              <a:t>Evaluation Metrics</a:t>
+            </a:r>
+          </a:p>
+          <a:p>
+            <a:pPr>
+              <a:spcAft>
+                <a:spcPts val="450"/>
+              </a:spcAft>
+            </a:pPr>
+            <a:r>
+              <a:rPr lang="en-GB" sz="2100" dirty="0">
+                <a:latin typeface="Roboto" panose="02000000000000000000" pitchFamily="2" charset="0"/>
+              </a:rPr>
+              <a:t>Accuracy: The proportion of correct predictions made by the model.</a:t>
+            </a:r>
+          </a:p>
+          <a:p>
+            <a:pPr>
+              <a:spcAft>
+                <a:spcPts val="450"/>
+              </a:spcAft>
+            </a:pPr>
+            <a:r>
+              <a:rPr lang="en-GB" sz="2100" dirty="0">
+                <a:latin typeface="Roboto" panose="02000000000000000000" pitchFamily="2" charset="0"/>
+              </a:rPr>
+              <a:t>Precision: The ability of the model to correctly identify positive instances.</a:t>
+            </a:r>
+          </a:p>
+          <a:p>
+            <a:pPr>
+              <a:spcAft>
+                <a:spcPts val="450"/>
+              </a:spcAft>
+            </a:pPr>
+            <a:r>
+              <a:rPr lang="en-GB" sz="2100" dirty="0">
+                <a:latin typeface="Roboto" panose="02000000000000000000" pitchFamily="2" charset="0"/>
+              </a:rPr>
+              <a:t>Recall: The ability of the model to capture all positive instances.</a:t>
+            </a:r>
+          </a:p>
+          <a:p>
+            <a:pPr>
+              <a:spcAft>
+                <a:spcPts val="450"/>
+              </a:spcAft>
+            </a:pPr>
+            <a:r>
+              <a:rPr lang="en-GB" sz="2100" dirty="0">
+                <a:latin typeface="Roboto" panose="02000000000000000000" pitchFamily="2" charset="0"/>
+              </a:rPr>
+              <a:t>F1-Score: The harmonic mean of precision and recall, balancing the two.</a:t>
+            </a:r>
+          </a:p>
+          <a:p>
+            <a:pPr>
+              <a:spcAft>
+                <a:spcPts val="450"/>
+              </a:spcAft>
+            </a:pPr>
+            <a:r>
+              <a:rPr lang="en-GB" sz="2100" dirty="0">
+                <a:latin typeface="Roboto" panose="02000000000000000000" pitchFamily="2" charset="0"/>
+              </a:rPr>
+              <a:t>Confusion Matrix: A detailed breakdown of the model's performance across different classes.</a:t>
+            </a:r>
+          </a:p>
+          <a:p>
+            <a:endParaRPr lang="en-KE" dirty="0"/>
+          </a:p>
+        </p:txBody>
+      </p:sp>
+    </p:spTree>
+    <p:extLst>
+      <p:ext uri="{BB962C8B-B14F-4D97-AF65-F5344CB8AC3E}">
+        <p14:creationId xmlns:p14="http://schemas.microsoft.com/office/powerpoint/2010/main" val="1254221650"/>
       </p:ext>
     </p:extLst>
   </p:cSld>

</xml_diff>